<commit_message>
feat(circuitbreaker-sample): Atualização slide apresentação
Atualização no slide de apresentação
</commit_message>
<xml_diff>
--- a/circuit breaker.pptx
+++ b/circuit breaker.pptx
@@ -5,7 +5,7 @@
     <p:sldMasterId id="2147483648" r:id="rId1"/>
   </p:sldMasterIdLst>
   <p:notesMasterIdLst>
-    <p:notesMasterId r:id="rId12"/>
+    <p:notesMasterId r:id="rId14"/>
   </p:notesMasterIdLst>
   <p:sldIdLst>
     <p:sldId id="256" r:id="rId2"/>
@@ -18,6 +18,8 @@
     <p:sldId id="260" r:id="rId9"/>
     <p:sldId id="274" r:id="rId10"/>
     <p:sldId id="275" r:id="rId11"/>
+    <p:sldId id="276" r:id="rId12"/>
+    <p:sldId id="277" r:id="rId13"/>
   </p:sldIdLst>
   <p:sldSz cx="12192000" cy="6858000"/>
   <p:notesSz cx="6858000" cy="9144000"/>
@@ -206,7 +208,7 @@
           <a:p>
             <a:fld id="{FB94CB17-A0FB-4517-AB07-3CA3AE17D330}" type="datetimeFigureOut">
               <a:rPr lang="pt-BR" smtClean="0"/>
-              <a:t>25/09/2021</a:t>
+              <a:t>26/09/2021</a:t>
             </a:fld>
             <a:endParaRPr lang="pt-BR"/>
           </a:p>
@@ -1009,7 +1011,7 @@
           <a:p>
             <a:fld id="{AD73DC33-42DD-4062-BC62-231C1BBE072E}" type="datetimeFigureOut">
               <a:rPr lang="pt-BR" smtClean="0"/>
-              <a:t>23/09/2021</a:t>
+              <a:t>26/09/2021</a:t>
             </a:fld>
             <a:endParaRPr lang="pt-BR"/>
           </a:p>
@@ -1207,7 +1209,7 @@
           <a:p>
             <a:fld id="{AD73DC33-42DD-4062-BC62-231C1BBE072E}" type="datetimeFigureOut">
               <a:rPr lang="pt-BR" smtClean="0"/>
-              <a:t>23/09/2021</a:t>
+              <a:t>26/09/2021</a:t>
             </a:fld>
             <a:endParaRPr lang="pt-BR"/>
           </a:p>
@@ -1415,7 +1417,7 @@
           <a:p>
             <a:fld id="{AD73DC33-42DD-4062-BC62-231C1BBE072E}" type="datetimeFigureOut">
               <a:rPr lang="pt-BR" smtClean="0"/>
-              <a:t>23/09/2021</a:t>
+              <a:t>26/09/2021</a:t>
             </a:fld>
             <a:endParaRPr lang="pt-BR"/>
           </a:p>
@@ -1613,7 +1615,7 @@
           <a:p>
             <a:fld id="{AD73DC33-42DD-4062-BC62-231C1BBE072E}" type="datetimeFigureOut">
               <a:rPr lang="pt-BR" smtClean="0"/>
-              <a:t>23/09/2021</a:t>
+              <a:t>26/09/2021</a:t>
             </a:fld>
             <a:endParaRPr lang="pt-BR"/>
           </a:p>
@@ -1888,7 +1890,7 @@
           <a:p>
             <a:fld id="{AD73DC33-42DD-4062-BC62-231C1BBE072E}" type="datetimeFigureOut">
               <a:rPr lang="pt-BR" smtClean="0"/>
-              <a:t>23/09/2021</a:t>
+              <a:t>26/09/2021</a:t>
             </a:fld>
             <a:endParaRPr lang="pt-BR"/>
           </a:p>
@@ -2153,7 +2155,7 @@
           <a:p>
             <a:fld id="{AD73DC33-42DD-4062-BC62-231C1BBE072E}" type="datetimeFigureOut">
               <a:rPr lang="pt-BR" smtClean="0"/>
-              <a:t>23/09/2021</a:t>
+              <a:t>26/09/2021</a:t>
             </a:fld>
             <a:endParaRPr lang="pt-BR"/>
           </a:p>
@@ -2565,7 +2567,7 @@
           <a:p>
             <a:fld id="{AD73DC33-42DD-4062-BC62-231C1BBE072E}" type="datetimeFigureOut">
               <a:rPr lang="pt-BR" smtClean="0"/>
-              <a:t>23/09/2021</a:t>
+              <a:t>26/09/2021</a:t>
             </a:fld>
             <a:endParaRPr lang="pt-BR"/>
           </a:p>
@@ -2706,7 +2708,7 @@
           <a:p>
             <a:fld id="{AD73DC33-42DD-4062-BC62-231C1BBE072E}" type="datetimeFigureOut">
               <a:rPr lang="pt-BR" smtClean="0"/>
-              <a:t>23/09/2021</a:t>
+              <a:t>26/09/2021</a:t>
             </a:fld>
             <a:endParaRPr lang="pt-BR"/>
           </a:p>
@@ -2819,7 +2821,7 @@
           <a:p>
             <a:fld id="{AD73DC33-42DD-4062-BC62-231C1BBE072E}" type="datetimeFigureOut">
               <a:rPr lang="pt-BR" smtClean="0"/>
-              <a:t>23/09/2021</a:t>
+              <a:t>26/09/2021</a:t>
             </a:fld>
             <a:endParaRPr lang="pt-BR"/>
           </a:p>
@@ -3130,7 +3132,7 @@
           <a:p>
             <a:fld id="{AD73DC33-42DD-4062-BC62-231C1BBE072E}" type="datetimeFigureOut">
               <a:rPr lang="pt-BR" smtClean="0"/>
-              <a:t>23/09/2021</a:t>
+              <a:t>26/09/2021</a:t>
             </a:fld>
             <a:endParaRPr lang="pt-BR"/>
           </a:p>
@@ -3418,7 +3420,7 @@
           <a:p>
             <a:fld id="{AD73DC33-42DD-4062-BC62-231C1BBE072E}" type="datetimeFigureOut">
               <a:rPr lang="pt-BR" smtClean="0"/>
-              <a:t>23/09/2021</a:t>
+              <a:t>26/09/2021</a:t>
             </a:fld>
             <a:endParaRPr lang="pt-BR"/>
           </a:p>
@@ -3659,7 +3661,7 @@
           <a:p>
             <a:fld id="{AD73DC33-42DD-4062-BC62-231C1BBE072E}" type="datetimeFigureOut">
               <a:rPr lang="pt-BR" smtClean="0"/>
-              <a:t>23/09/2021</a:t>
+              <a:t>26/09/2021</a:t>
             </a:fld>
             <a:endParaRPr lang="pt-BR"/>
           </a:p>
@@ -4098,43 +4100,18 @@
           <a:lstStyle/>
           <a:p>
             <a:r>
-              <a:rPr lang="pt-BR" dirty="0" err="1"/>
+              <a:rPr lang="pt-BR" i="1" dirty="0" err="1"/>
               <a:t>Circuit</a:t>
             </a:r>
             <a:r>
-              <a:rPr lang="pt-BR" dirty="0"/>
+              <a:rPr lang="pt-BR" i="1" dirty="0"/>
               <a:t> </a:t>
             </a:r>
             <a:r>
-              <a:rPr lang="pt-BR" dirty="0" err="1"/>
+              <a:rPr lang="pt-BR" i="1" dirty="0" err="1"/>
               <a:t>Breaker</a:t>
             </a:r>
-            <a:endParaRPr lang="pt-BR" dirty="0"/>
-          </a:p>
-        </p:txBody>
-      </p:sp>
-      <p:sp>
-        <p:nvSpPr>
-          <p:cNvPr id="3" name="Subtítulo 2">
-            <a:extLst>
-              <a:ext uri="{FF2B5EF4-FFF2-40B4-BE49-F238E27FC236}">
-                <a16:creationId xmlns:a16="http://schemas.microsoft.com/office/drawing/2014/main" id="{FEB3C09F-A695-44C6-AC6E-C0E8DFD5E534}"/>
-              </a:ext>
-            </a:extLst>
-          </p:cNvPr>
-          <p:cNvSpPr>
-            <a:spLocks noGrp="1"/>
-          </p:cNvSpPr>
-          <p:nvPr>
-            <p:ph type="subTitle" idx="1"/>
-          </p:nvPr>
-        </p:nvSpPr>
-        <p:spPr/>
-        <p:txBody>
-          <a:bodyPr/>
-          <a:lstStyle/>
-          <a:p>
-            <a:endParaRPr lang="pt-BR" dirty="0"/>
+            <a:endParaRPr lang="pt-BR" i="1" dirty="0"/>
           </a:p>
         </p:txBody>
       </p:sp>
@@ -4249,7 +4226,9 @@
               <a:t>:  </a:t>
             </a:r>
             <a:r>
-              <a:rPr lang="pt-BR" dirty="0" err="1"/>
+              <a:rPr lang="pt-BR" i="1" dirty="0" err="1">
+                <a:hlinkClick r:id="rId2"/>
+              </a:rPr>
               <a:t>Istio</a:t>
             </a:r>
             <a:r>
@@ -4265,7 +4244,7 @@
             <a:pPr lvl="1"/>
             <a:r>
               <a:rPr lang="pt-BR" dirty="0"/>
-              <a:t>Substituir por algo que depende de regra de negócios (</a:t>
+              <a:t>Substituir por algo que depende da lógica de negócios (</a:t>
             </a:r>
             <a:r>
               <a:rPr lang="pt-BR" dirty="0" err="1"/>
@@ -4290,6 +4269,733 @@
     <p:extLst>
       <p:ext uri="{BB962C8B-B14F-4D97-AF65-F5344CB8AC3E}">
         <p14:creationId xmlns:p14="http://schemas.microsoft.com/office/powerpoint/2010/main" val="306350363"/>
+      </p:ext>
+    </p:extLst>
+  </p:cSld>
+  <p:clrMapOvr>
+    <a:masterClrMapping/>
+  </p:clrMapOvr>
+</p:sld>
+</file>
+
+<file path=ppt/slides/slide11.xml><?xml version="1.0" encoding="utf-8"?>
+<p:sld xmlns:a="http://schemas.openxmlformats.org/drawingml/2006/main" xmlns:r="http://schemas.openxmlformats.org/officeDocument/2006/relationships" xmlns:p="http://schemas.openxmlformats.org/presentationml/2006/main">
+  <p:cSld>
+    <p:spTree>
+      <p:nvGrpSpPr>
+        <p:cNvPr id="1" name=""/>
+        <p:cNvGrpSpPr/>
+        <p:nvPr/>
+      </p:nvGrpSpPr>
+      <p:grpSpPr>
+        <a:xfrm>
+          <a:off x="0" y="0"/>
+          <a:ext cx="0" cy="0"/>
+          <a:chOff x="0" y="0"/>
+          <a:chExt cx="0" cy="0"/>
+        </a:xfrm>
+      </p:grpSpPr>
+      <p:sp>
+        <p:nvSpPr>
+          <p:cNvPr id="2" name="Título 1">
+            <a:extLst>
+              <a:ext uri="{FF2B5EF4-FFF2-40B4-BE49-F238E27FC236}">
+                <a16:creationId xmlns:a16="http://schemas.microsoft.com/office/drawing/2014/main" id="{819863A2-E765-4FE7-B3DB-88CB1BED83B1}"/>
+              </a:ext>
+            </a:extLst>
+          </p:cNvPr>
+          <p:cNvSpPr>
+            <a:spLocks noGrp="1"/>
+          </p:cNvSpPr>
+          <p:nvPr>
+            <p:ph type="title"/>
+          </p:nvPr>
+        </p:nvSpPr>
+        <p:spPr/>
+        <p:txBody>
+          <a:bodyPr/>
+          <a:lstStyle/>
+          <a:p>
+            <a:r>
+              <a:rPr lang="pt-BR" i="1" dirty="0"/>
+              <a:t>Service </a:t>
+            </a:r>
+            <a:r>
+              <a:rPr lang="pt-BR" i="1" dirty="0" err="1"/>
+              <a:t>Mesh</a:t>
+            </a:r>
+            <a:endParaRPr lang="pt-BR" i="1" dirty="0"/>
+          </a:p>
+        </p:txBody>
+      </p:sp>
+      <p:sp>
+        <p:nvSpPr>
+          <p:cNvPr id="3" name="Espaço Reservado para Conteúdo 2">
+            <a:extLst>
+              <a:ext uri="{FF2B5EF4-FFF2-40B4-BE49-F238E27FC236}">
+                <a16:creationId xmlns:a16="http://schemas.microsoft.com/office/drawing/2014/main" id="{E5B18A19-756A-4C42-8643-AE506AC5F2CF}"/>
+              </a:ext>
+            </a:extLst>
+          </p:cNvPr>
+          <p:cNvSpPr>
+            <a:spLocks noGrp="1"/>
+          </p:cNvSpPr>
+          <p:nvPr>
+            <p:ph idx="1"/>
+          </p:nvPr>
+        </p:nvSpPr>
+        <p:spPr/>
+        <p:txBody>
+          <a:bodyPr/>
+          <a:lstStyle/>
+          <a:p>
+            <a:r>
+              <a:rPr lang="pt-BR" dirty="0"/>
+              <a:t>Um </a:t>
+            </a:r>
+            <a:r>
+              <a:rPr lang="pt-BR" i="1" dirty="0"/>
+              <a:t>Service </a:t>
+            </a:r>
+            <a:r>
+              <a:rPr lang="pt-BR" i="1" dirty="0" err="1"/>
+              <a:t>Mesh</a:t>
+            </a:r>
+            <a:r>
+              <a:rPr lang="pt-BR" dirty="0"/>
+              <a:t>, é uma camada de infraestrutura de baixa latência configurável, projetada para lidar com alto volume de comunicações entre </a:t>
+            </a:r>
+            <a:r>
+              <a:rPr lang="pt-BR" i="1" dirty="0" err="1"/>
+              <a:t>API</a:t>
+            </a:r>
+            <a:r>
+              <a:rPr lang="pt-BR" dirty="0" err="1"/>
+              <a:t>'s</a:t>
+            </a:r>
+            <a:r>
+              <a:rPr lang="pt-BR" dirty="0"/>
+              <a:t>.</a:t>
+            </a:r>
+          </a:p>
+          <a:p>
+            <a:r>
+              <a:rPr lang="pt-BR" dirty="0"/>
+              <a:t>Ela garante que a comunicação entre as instancias dos serviços, flexível, confiável e rápida. Além disso fornece algumas capacidades como </a:t>
+            </a:r>
+            <a:r>
+              <a:rPr lang="pt-BR" i="1" dirty="0" err="1"/>
+              <a:t>Load</a:t>
+            </a:r>
+            <a:r>
+              <a:rPr lang="pt-BR" i="1" dirty="0"/>
+              <a:t> </a:t>
+            </a:r>
+            <a:r>
+              <a:rPr lang="pt-BR" i="1" dirty="0" err="1"/>
+              <a:t>Balancers</a:t>
+            </a:r>
+            <a:r>
+              <a:rPr lang="pt-BR" dirty="0"/>
+              <a:t>, Criptografia, Autenticação, suporte para os padrões de </a:t>
+            </a:r>
+            <a:r>
+              <a:rPr lang="pt-BR" i="1" dirty="0" err="1"/>
+              <a:t>Circuit</a:t>
+            </a:r>
+            <a:r>
+              <a:rPr lang="pt-BR" i="1" dirty="0"/>
+              <a:t> </a:t>
+            </a:r>
+            <a:r>
+              <a:rPr lang="pt-BR" i="1" dirty="0" err="1"/>
+              <a:t>Breakers</a:t>
+            </a:r>
+            <a:r>
+              <a:rPr lang="pt-BR" dirty="0"/>
+              <a:t>, dentre outras.</a:t>
+            </a:r>
+          </a:p>
+        </p:txBody>
+      </p:sp>
+      <p:sp>
+        <p:nvSpPr>
+          <p:cNvPr id="5" name="Retângulo 4">
+            <a:extLst>
+              <a:ext uri="{FF2B5EF4-FFF2-40B4-BE49-F238E27FC236}">
+                <a16:creationId xmlns:a16="http://schemas.microsoft.com/office/drawing/2014/main" id="{1B1B98C2-882E-44B8-94B2-6498B4952B06}"/>
+              </a:ext>
+            </a:extLst>
+          </p:cNvPr>
+          <p:cNvSpPr/>
+          <p:nvPr/>
+        </p:nvSpPr>
+        <p:spPr>
+          <a:xfrm>
+            <a:off x="1315612" y="4904406"/>
+            <a:ext cx="4355724" cy="1080654"/>
+          </a:xfrm>
+          <a:prstGeom prst="rect">
+            <a:avLst/>
+          </a:prstGeom>
+        </p:spPr>
+        <p:style>
+          <a:lnRef idx="1">
+            <a:schemeClr val="accent1"/>
+          </a:lnRef>
+          <a:fillRef idx="2">
+            <a:schemeClr val="accent1"/>
+          </a:fillRef>
+          <a:effectRef idx="1">
+            <a:schemeClr val="accent1"/>
+          </a:effectRef>
+          <a:fontRef idx="minor">
+            <a:schemeClr val="dk1"/>
+          </a:fontRef>
+        </p:style>
+        <p:txBody>
+          <a:bodyPr rtlCol="0" anchor="ctr"/>
+          <a:lstStyle/>
+          <a:p>
+            <a:r>
+              <a:rPr lang="pt-BR" dirty="0"/>
+              <a:t>Container</a:t>
+            </a:r>
+          </a:p>
+        </p:txBody>
+      </p:sp>
+      <p:sp>
+        <p:nvSpPr>
+          <p:cNvPr id="6" name="Retângulo: Cantos Arredondados 5">
+            <a:extLst>
+              <a:ext uri="{FF2B5EF4-FFF2-40B4-BE49-F238E27FC236}">
+                <a16:creationId xmlns:a16="http://schemas.microsoft.com/office/drawing/2014/main" id="{D83F12DE-4BD6-4E49-BD1E-FE54D513AF67}"/>
+              </a:ext>
+            </a:extLst>
+          </p:cNvPr>
+          <p:cNvSpPr/>
+          <p:nvPr/>
+        </p:nvSpPr>
+        <p:spPr>
+          <a:xfrm>
+            <a:off x="2403297" y="4987533"/>
+            <a:ext cx="1561673" cy="914400"/>
+          </a:xfrm>
+          <a:prstGeom prst="roundRect">
+            <a:avLst/>
+          </a:prstGeom>
+        </p:spPr>
+        <p:style>
+          <a:lnRef idx="1">
+            <a:schemeClr val="accent6"/>
+          </a:lnRef>
+          <a:fillRef idx="2">
+            <a:schemeClr val="accent6"/>
+          </a:fillRef>
+          <a:effectRef idx="1">
+            <a:schemeClr val="accent6"/>
+          </a:effectRef>
+          <a:fontRef idx="minor">
+            <a:schemeClr val="dk1"/>
+          </a:fontRef>
+        </p:style>
+        <p:txBody>
+          <a:bodyPr rtlCol="0" anchor="ctr"/>
+          <a:lstStyle/>
+          <a:p>
+            <a:pPr algn="ctr"/>
+            <a:r>
+              <a:rPr lang="pt-BR" dirty="0"/>
+              <a:t>Aplicação A</a:t>
+            </a:r>
+          </a:p>
+        </p:txBody>
+      </p:sp>
+      <p:sp>
+        <p:nvSpPr>
+          <p:cNvPr id="7" name="Retângulo: Cantos Arredondados 6">
+            <a:extLst>
+              <a:ext uri="{FF2B5EF4-FFF2-40B4-BE49-F238E27FC236}">
+                <a16:creationId xmlns:a16="http://schemas.microsoft.com/office/drawing/2014/main" id="{376280D4-7EBB-45E9-AE70-61C68D8BF6C5}"/>
+              </a:ext>
+            </a:extLst>
+          </p:cNvPr>
+          <p:cNvSpPr/>
+          <p:nvPr/>
+        </p:nvSpPr>
+        <p:spPr>
+          <a:xfrm>
+            <a:off x="4595455" y="4987533"/>
+            <a:ext cx="914400" cy="914400"/>
+          </a:xfrm>
+          <a:prstGeom prst="roundRect">
+            <a:avLst/>
+          </a:prstGeom>
+        </p:spPr>
+        <p:style>
+          <a:lnRef idx="1">
+            <a:schemeClr val="accent4"/>
+          </a:lnRef>
+          <a:fillRef idx="2">
+            <a:schemeClr val="accent4"/>
+          </a:fillRef>
+          <a:effectRef idx="1">
+            <a:schemeClr val="accent4"/>
+          </a:effectRef>
+          <a:fontRef idx="minor">
+            <a:schemeClr val="dk1"/>
+          </a:fontRef>
+        </p:style>
+        <p:txBody>
+          <a:bodyPr rtlCol="0" anchor="ctr"/>
+          <a:lstStyle/>
+          <a:p>
+            <a:pPr algn="ctr"/>
+            <a:r>
+              <a:rPr lang="pt-BR" dirty="0"/>
+              <a:t>Proxy</a:t>
+            </a:r>
+          </a:p>
+        </p:txBody>
+      </p:sp>
+      <p:cxnSp>
+        <p:nvCxnSpPr>
+          <p:cNvPr id="8" name="Conector de Seta Reta 7">
+            <a:extLst>
+              <a:ext uri="{FF2B5EF4-FFF2-40B4-BE49-F238E27FC236}">
+                <a16:creationId xmlns:a16="http://schemas.microsoft.com/office/drawing/2014/main" id="{4A50D032-A5CB-4F07-93C0-15CC6F3C3A19}"/>
+              </a:ext>
+            </a:extLst>
+          </p:cNvPr>
+          <p:cNvCxnSpPr>
+            <a:stCxn id="6" idx="3"/>
+            <a:endCxn id="7" idx="1"/>
+          </p:cNvCxnSpPr>
+          <p:nvPr/>
+        </p:nvCxnSpPr>
+        <p:spPr>
+          <a:xfrm>
+            <a:off x="3964970" y="5444733"/>
+            <a:ext cx="630485" cy="0"/>
+          </a:xfrm>
+          <a:prstGeom prst="straightConnector1">
+            <a:avLst/>
+          </a:prstGeom>
+          <a:ln>
+            <a:tailEnd type="triangle"/>
+          </a:ln>
+        </p:spPr>
+        <p:style>
+          <a:lnRef idx="3">
+            <a:schemeClr val="dk1"/>
+          </a:lnRef>
+          <a:fillRef idx="0">
+            <a:schemeClr val="dk1"/>
+          </a:fillRef>
+          <a:effectRef idx="2">
+            <a:schemeClr val="dk1"/>
+          </a:effectRef>
+          <a:fontRef idx="minor">
+            <a:schemeClr val="tx1"/>
+          </a:fontRef>
+        </p:style>
+      </p:cxnSp>
+      <p:sp>
+        <p:nvSpPr>
+          <p:cNvPr id="9" name="Retângulo 8">
+            <a:extLst>
+              <a:ext uri="{FF2B5EF4-FFF2-40B4-BE49-F238E27FC236}">
+                <a16:creationId xmlns:a16="http://schemas.microsoft.com/office/drawing/2014/main" id="{D140E804-5D85-43F7-9741-F98CDF4C1955}"/>
+              </a:ext>
+            </a:extLst>
+          </p:cNvPr>
+          <p:cNvSpPr/>
+          <p:nvPr/>
+        </p:nvSpPr>
+        <p:spPr>
+          <a:xfrm>
+            <a:off x="7078894" y="4904406"/>
+            <a:ext cx="3433957" cy="1080654"/>
+          </a:xfrm>
+          <a:prstGeom prst="rect">
+            <a:avLst/>
+          </a:prstGeom>
+        </p:spPr>
+        <p:style>
+          <a:lnRef idx="1">
+            <a:schemeClr val="accent1"/>
+          </a:lnRef>
+          <a:fillRef idx="2">
+            <a:schemeClr val="accent1"/>
+          </a:fillRef>
+          <a:effectRef idx="1">
+            <a:schemeClr val="accent1"/>
+          </a:effectRef>
+          <a:fontRef idx="minor">
+            <a:schemeClr val="dk1"/>
+          </a:fontRef>
+        </p:style>
+        <p:txBody>
+          <a:bodyPr rtlCol="0" anchor="ctr"/>
+          <a:lstStyle/>
+          <a:p>
+            <a:endParaRPr lang="pt-BR" dirty="0"/>
+          </a:p>
+        </p:txBody>
+      </p:sp>
+      <p:sp>
+        <p:nvSpPr>
+          <p:cNvPr id="11" name="Retângulo: Cantos Arredondados 10">
+            <a:extLst>
+              <a:ext uri="{FF2B5EF4-FFF2-40B4-BE49-F238E27FC236}">
+                <a16:creationId xmlns:a16="http://schemas.microsoft.com/office/drawing/2014/main" id="{8A30243B-EAC8-414C-B8ED-70E220CA0FE7}"/>
+              </a:ext>
+            </a:extLst>
+          </p:cNvPr>
+          <p:cNvSpPr/>
+          <p:nvPr/>
+        </p:nvSpPr>
+        <p:spPr>
+          <a:xfrm>
+            <a:off x="7244813" y="4987533"/>
+            <a:ext cx="914400" cy="914400"/>
+          </a:xfrm>
+          <a:prstGeom prst="roundRect">
+            <a:avLst/>
+          </a:prstGeom>
+        </p:spPr>
+        <p:style>
+          <a:lnRef idx="1">
+            <a:schemeClr val="accent4"/>
+          </a:lnRef>
+          <a:fillRef idx="2">
+            <a:schemeClr val="accent4"/>
+          </a:fillRef>
+          <a:effectRef idx="1">
+            <a:schemeClr val="accent4"/>
+          </a:effectRef>
+          <a:fontRef idx="minor">
+            <a:schemeClr val="dk1"/>
+          </a:fontRef>
+        </p:style>
+        <p:txBody>
+          <a:bodyPr rtlCol="0" anchor="ctr"/>
+          <a:lstStyle/>
+          <a:p>
+            <a:pPr algn="ctr"/>
+            <a:r>
+              <a:rPr lang="pt-BR" dirty="0"/>
+              <a:t>Proxy</a:t>
+            </a:r>
+          </a:p>
+        </p:txBody>
+      </p:sp>
+      <p:cxnSp>
+        <p:nvCxnSpPr>
+          <p:cNvPr id="13" name="Conector de Seta Reta 12">
+            <a:extLst>
+              <a:ext uri="{FF2B5EF4-FFF2-40B4-BE49-F238E27FC236}">
+                <a16:creationId xmlns:a16="http://schemas.microsoft.com/office/drawing/2014/main" id="{0D8DB861-640A-4836-9842-A51283AA229E}"/>
+              </a:ext>
+            </a:extLst>
+          </p:cNvPr>
+          <p:cNvCxnSpPr>
+            <a:cxnSpLocks/>
+            <a:stCxn id="7" idx="3"/>
+            <a:endCxn id="11" idx="1"/>
+          </p:cNvCxnSpPr>
+          <p:nvPr/>
+        </p:nvCxnSpPr>
+        <p:spPr>
+          <a:xfrm>
+            <a:off x="5509855" y="5444733"/>
+            <a:ext cx="1734958" cy="0"/>
+          </a:xfrm>
+          <a:prstGeom prst="straightConnector1">
+            <a:avLst/>
+          </a:prstGeom>
+          <a:ln>
+            <a:tailEnd type="triangle"/>
+          </a:ln>
+        </p:spPr>
+        <p:style>
+          <a:lnRef idx="3">
+            <a:schemeClr val="dk1"/>
+          </a:lnRef>
+          <a:fillRef idx="0">
+            <a:schemeClr val="dk1"/>
+          </a:fillRef>
+          <a:effectRef idx="2">
+            <a:schemeClr val="dk1"/>
+          </a:effectRef>
+          <a:fontRef idx="minor">
+            <a:schemeClr val="tx1"/>
+          </a:fontRef>
+        </p:style>
+      </p:cxnSp>
+      <p:sp>
+        <p:nvSpPr>
+          <p:cNvPr id="14" name="Retângulo: Cantos Arredondados 13">
+            <a:extLst>
+              <a:ext uri="{FF2B5EF4-FFF2-40B4-BE49-F238E27FC236}">
+                <a16:creationId xmlns:a16="http://schemas.microsoft.com/office/drawing/2014/main" id="{F3A5DF86-C9EF-4616-8917-17DF3B3C0BA6}"/>
+              </a:ext>
+            </a:extLst>
+          </p:cNvPr>
+          <p:cNvSpPr/>
+          <p:nvPr/>
+        </p:nvSpPr>
+        <p:spPr>
+          <a:xfrm>
+            <a:off x="8652371" y="4987533"/>
+            <a:ext cx="1561673" cy="914400"/>
+          </a:xfrm>
+          <a:prstGeom prst="roundRect">
+            <a:avLst/>
+          </a:prstGeom>
+        </p:spPr>
+        <p:style>
+          <a:lnRef idx="1">
+            <a:schemeClr val="accent6"/>
+          </a:lnRef>
+          <a:fillRef idx="2">
+            <a:schemeClr val="accent6"/>
+          </a:fillRef>
+          <a:effectRef idx="1">
+            <a:schemeClr val="accent6"/>
+          </a:effectRef>
+          <a:fontRef idx="minor">
+            <a:schemeClr val="dk1"/>
+          </a:fontRef>
+        </p:style>
+        <p:txBody>
+          <a:bodyPr rtlCol="0" anchor="ctr"/>
+          <a:lstStyle/>
+          <a:p>
+            <a:pPr algn="ctr"/>
+            <a:r>
+              <a:rPr lang="pt-BR" dirty="0"/>
+              <a:t>Aplicação B</a:t>
+            </a:r>
+          </a:p>
+        </p:txBody>
+      </p:sp>
+      <p:cxnSp>
+        <p:nvCxnSpPr>
+          <p:cNvPr id="16" name="Conector de Seta Reta 15">
+            <a:extLst>
+              <a:ext uri="{FF2B5EF4-FFF2-40B4-BE49-F238E27FC236}">
+                <a16:creationId xmlns:a16="http://schemas.microsoft.com/office/drawing/2014/main" id="{929F0549-F908-4360-BBD3-AFF319DBE27A}"/>
+              </a:ext>
+            </a:extLst>
+          </p:cNvPr>
+          <p:cNvCxnSpPr>
+            <a:cxnSpLocks/>
+            <a:stCxn id="11" idx="3"/>
+            <a:endCxn id="14" idx="1"/>
+          </p:cNvCxnSpPr>
+          <p:nvPr/>
+        </p:nvCxnSpPr>
+        <p:spPr>
+          <a:xfrm>
+            <a:off x="8159213" y="5444733"/>
+            <a:ext cx="493158" cy="0"/>
+          </a:xfrm>
+          <a:prstGeom prst="straightConnector1">
+            <a:avLst/>
+          </a:prstGeom>
+          <a:ln>
+            <a:tailEnd type="triangle"/>
+          </a:ln>
+        </p:spPr>
+        <p:style>
+          <a:lnRef idx="3">
+            <a:schemeClr val="dk1"/>
+          </a:lnRef>
+          <a:fillRef idx="0">
+            <a:schemeClr val="dk1"/>
+          </a:fillRef>
+          <a:effectRef idx="2">
+            <a:schemeClr val="dk1"/>
+          </a:effectRef>
+          <a:fontRef idx="minor">
+            <a:schemeClr val="tx1"/>
+          </a:fontRef>
+        </p:style>
+      </p:cxnSp>
+    </p:spTree>
+    <p:extLst>
+      <p:ext uri="{BB962C8B-B14F-4D97-AF65-F5344CB8AC3E}">
+        <p14:creationId xmlns:p14="http://schemas.microsoft.com/office/powerpoint/2010/main" val="687999733"/>
+      </p:ext>
+    </p:extLst>
+  </p:cSld>
+  <p:clrMapOvr>
+    <a:masterClrMapping/>
+  </p:clrMapOvr>
+</p:sld>
+</file>
+
+<file path=ppt/slides/slide12.xml><?xml version="1.0" encoding="utf-8"?>
+<p:sld xmlns:a="http://schemas.openxmlformats.org/drawingml/2006/main" xmlns:r="http://schemas.openxmlformats.org/officeDocument/2006/relationships" xmlns:p="http://schemas.openxmlformats.org/presentationml/2006/main">
+  <p:cSld>
+    <p:spTree>
+      <p:nvGrpSpPr>
+        <p:cNvPr id="1" name=""/>
+        <p:cNvGrpSpPr/>
+        <p:nvPr/>
+      </p:nvGrpSpPr>
+      <p:grpSpPr>
+        <a:xfrm>
+          <a:off x="0" y="0"/>
+          <a:ext cx="0" cy="0"/>
+          <a:chOff x="0" y="0"/>
+          <a:chExt cx="0" cy="0"/>
+        </a:xfrm>
+      </p:grpSpPr>
+      <p:sp>
+        <p:nvSpPr>
+          <p:cNvPr id="2" name="Título 1">
+            <a:extLst>
+              <a:ext uri="{FF2B5EF4-FFF2-40B4-BE49-F238E27FC236}">
+                <a16:creationId xmlns:a16="http://schemas.microsoft.com/office/drawing/2014/main" id="{08C4BC34-069E-4388-A23C-5AA9B26E5A0E}"/>
+              </a:ext>
+            </a:extLst>
+          </p:cNvPr>
+          <p:cNvSpPr>
+            <a:spLocks noGrp="1"/>
+          </p:cNvSpPr>
+          <p:nvPr>
+            <p:ph type="title"/>
+          </p:nvPr>
+        </p:nvSpPr>
+        <p:spPr/>
+        <p:txBody>
+          <a:bodyPr/>
+          <a:lstStyle/>
+          <a:p>
+            <a:r>
+              <a:rPr lang="pt-BR" i="1" dirty="0">
+                <a:hlinkClick r:id="rId2"/>
+              </a:rPr>
+              <a:t>Resilience4J</a:t>
+            </a:r>
+            <a:endParaRPr lang="pt-BR" i="1" dirty="0"/>
+          </a:p>
+        </p:txBody>
+      </p:sp>
+      <p:sp>
+        <p:nvSpPr>
+          <p:cNvPr id="3" name="Espaço Reservado para Conteúdo 2">
+            <a:extLst>
+              <a:ext uri="{FF2B5EF4-FFF2-40B4-BE49-F238E27FC236}">
+                <a16:creationId xmlns:a16="http://schemas.microsoft.com/office/drawing/2014/main" id="{E44529AB-04B4-42BB-8C5E-C7063CEC3B14}"/>
+              </a:ext>
+            </a:extLst>
+          </p:cNvPr>
+          <p:cNvSpPr>
+            <a:spLocks noGrp="1"/>
+          </p:cNvSpPr>
+          <p:nvPr>
+            <p:ph idx="1"/>
+          </p:nvPr>
+        </p:nvSpPr>
+        <p:spPr/>
+        <p:txBody>
+          <a:bodyPr>
+            <a:normAutofit lnSpcReduction="10000"/>
+          </a:bodyPr>
+          <a:lstStyle/>
+          <a:p>
+            <a:r>
+              <a:rPr lang="pt-BR" dirty="0"/>
+              <a:t>“É uma biblioteca de tolerância à falhas leve e fácil de usar, que foi inspirada na biblioteca da Netflix </a:t>
+            </a:r>
+            <a:r>
+              <a:rPr lang="pt-BR" dirty="0" err="1"/>
+              <a:t>Hystrix</a:t>
+            </a:r>
+            <a:r>
+              <a:rPr lang="pt-BR" dirty="0"/>
+              <a:t>, porém projetado para Java 8 e programação funcional”.</a:t>
+            </a:r>
+          </a:p>
+          <a:p>
+            <a:r>
+              <a:rPr lang="pt-BR" dirty="0"/>
+              <a:t>Recursos modularizados:</a:t>
+            </a:r>
+          </a:p>
+          <a:p>
+            <a:pPr lvl="1"/>
+            <a:r>
+              <a:rPr lang="pt-BR" dirty="0" err="1"/>
+              <a:t>CircuitBreaker</a:t>
+            </a:r>
+            <a:endParaRPr lang="pt-BR" dirty="0"/>
+          </a:p>
+          <a:p>
+            <a:pPr lvl="1"/>
+            <a:r>
+              <a:rPr lang="pt-BR" dirty="0" err="1"/>
+              <a:t>Bulkhead</a:t>
+            </a:r>
+            <a:endParaRPr lang="pt-BR" dirty="0"/>
+          </a:p>
+          <a:p>
+            <a:pPr lvl="1"/>
+            <a:r>
+              <a:rPr lang="pt-BR" dirty="0" err="1"/>
+              <a:t>RateLimiter</a:t>
+            </a:r>
+            <a:endParaRPr lang="pt-BR" dirty="0"/>
+          </a:p>
+          <a:p>
+            <a:pPr lvl="1"/>
+            <a:r>
+              <a:rPr lang="pt-BR" dirty="0" err="1"/>
+              <a:t>Retry</a:t>
+            </a:r>
+            <a:endParaRPr lang="pt-BR" dirty="0"/>
+          </a:p>
+          <a:p>
+            <a:pPr lvl="1"/>
+            <a:r>
+              <a:rPr lang="pt-BR" dirty="0" err="1"/>
+              <a:t>TimeLimiter</a:t>
+            </a:r>
+            <a:endParaRPr lang="pt-BR" dirty="0"/>
+          </a:p>
+          <a:p>
+            <a:pPr lvl="1"/>
+            <a:r>
+              <a:rPr lang="pt-BR" dirty="0"/>
+              <a:t>Cache</a:t>
+            </a:r>
+          </a:p>
+          <a:p>
+            <a:r>
+              <a:rPr lang="pt-BR" dirty="0"/>
+              <a:t>Usa algumas interfaces funcionais do Java 8 e é baseado no </a:t>
+            </a:r>
+            <a:r>
+              <a:rPr lang="pt-BR" i="1" dirty="0" err="1">
+                <a:hlinkClick r:id="rId3"/>
+              </a:rPr>
+              <a:t>Vavr</a:t>
+            </a:r>
+            <a:r>
+              <a:rPr lang="pt-BR" i="1" dirty="0"/>
+              <a:t>.</a:t>
+            </a:r>
+            <a:endParaRPr lang="pt-BR" dirty="0"/>
+          </a:p>
+        </p:txBody>
+      </p:sp>
+    </p:spTree>
+    <p:extLst>
+      <p:ext uri="{BB962C8B-B14F-4D97-AF65-F5344CB8AC3E}">
+        <p14:creationId xmlns:p14="http://schemas.microsoft.com/office/powerpoint/2010/main" val="2641428068"/>
       </p:ext>
     </p:extLst>
   </p:cSld>
@@ -5300,11 +6006,11 @@
   <p:clrMapOvr>
     <a:masterClrMapping/>
   </p:clrMapOvr>
-  <mc:AlternateContent xmlns:mc="http://schemas.openxmlformats.org/markup-compatibility/2006">
-    <mc:Choice xmlns:p14="http://schemas.microsoft.com/office/powerpoint/2010/main" Requires="p14">
+  <mc:AlternateContent xmlns:mc="http://schemas.openxmlformats.org/markup-compatibility/2006" xmlns:p14="http://schemas.microsoft.com/office/powerpoint/2010/main">
+    <mc:Choice Requires="p14">
       <p:transition p14:dur="10"/>
     </mc:Choice>
-    <mc:Fallback>
+    <mc:Fallback xmlns="">
       <p:transition/>
     </mc:Fallback>
   </mc:AlternateContent>
@@ -6409,11 +7115,11 @@
   <p:clrMapOvr>
     <a:masterClrMapping/>
   </p:clrMapOvr>
-  <mc:AlternateContent xmlns:mc="http://schemas.openxmlformats.org/markup-compatibility/2006">
-    <mc:Choice xmlns:p14="http://schemas.microsoft.com/office/powerpoint/2010/main" Requires="p14">
+  <mc:AlternateContent xmlns:mc="http://schemas.openxmlformats.org/markup-compatibility/2006" xmlns:p14="http://schemas.microsoft.com/office/powerpoint/2010/main">
+    <mc:Choice Requires="p14">
       <p:transition p14:dur="10"/>
     </mc:Choice>
-    <mc:Fallback>
+    <mc:Fallback xmlns="">
       <p:transition/>
     </mc:Fallback>
   </mc:AlternateContent>
@@ -7592,35 +8298,51 @@
           <a:lstStyle/>
           <a:p>
             <a:r>
-              <a:rPr lang="pt-BR" dirty="0" err="1"/>
+              <a:rPr lang="pt-BR" i="1" dirty="0" err="1"/>
               <a:t>Fallback</a:t>
             </a:r>
+            <a:endParaRPr lang="pt-BR" i="1" dirty="0"/>
+          </a:p>
+        </p:txBody>
+      </p:sp>
+      <p:sp>
+        <p:nvSpPr>
+          <p:cNvPr id="3" name="Espaço Reservado para Conteúdo 2">
+            <a:extLst>
+              <a:ext uri="{FF2B5EF4-FFF2-40B4-BE49-F238E27FC236}">
+                <a16:creationId xmlns:a16="http://schemas.microsoft.com/office/drawing/2014/main" id="{96D42B5D-80B9-486E-BB7C-723FC2F1294A}"/>
+              </a:ext>
+            </a:extLst>
+          </p:cNvPr>
+          <p:cNvSpPr>
+            <a:spLocks noGrp="1"/>
+          </p:cNvSpPr>
+          <p:nvPr>
+            <p:ph idx="1"/>
+          </p:nvPr>
+        </p:nvSpPr>
+        <p:spPr/>
+        <p:txBody>
+          <a:bodyPr/>
+          <a:lstStyle/>
+          <a:p>
+            <a:pPr algn="ctr"/>
             <a:endParaRPr lang="pt-BR" dirty="0"/>
           </a:p>
-        </p:txBody>
-      </p:sp>
-      <p:sp>
-        <p:nvSpPr>
-          <p:cNvPr id="3" name="Espaço Reservado para Conteúdo 2">
-            <a:extLst>
-              <a:ext uri="{FF2B5EF4-FFF2-40B4-BE49-F238E27FC236}">
-                <a16:creationId xmlns:a16="http://schemas.microsoft.com/office/drawing/2014/main" id="{96D42B5D-80B9-486E-BB7C-723FC2F1294A}"/>
-              </a:ext>
-            </a:extLst>
-          </p:cNvPr>
-          <p:cNvSpPr>
-            <a:spLocks noGrp="1"/>
-          </p:cNvSpPr>
-          <p:nvPr>
-            <p:ph idx="1"/>
-          </p:nvPr>
-        </p:nvSpPr>
-        <p:spPr/>
-        <p:txBody>
-          <a:bodyPr/>
-          <a:lstStyle/>
-          <a:p>
+          <a:p>
+            <a:pPr algn="ctr"/>
             <a:endParaRPr lang="pt-BR" dirty="0"/>
+          </a:p>
+          <a:p>
+            <a:pPr algn="ctr"/>
+            <a:endParaRPr lang="pt-BR" dirty="0"/>
+          </a:p>
+          <a:p>
+            <a:pPr algn="ctr"/>
+            <a:r>
+              <a:rPr lang="pt-BR" dirty="0"/>
+              <a:t>O que fazer caso hajam falhas nas chamadas à outros micros serviços?</a:t>
+            </a:r>
           </a:p>
         </p:txBody>
       </p:sp>
@@ -8122,11 +8844,11 @@
   <p:clrMapOvr>
     <a:masterClrMapping/>
   </p:clrMapOvr>
-  <mc:AlternateContent xmlns:mc="http://schemas.openxmlformats.org/markup-compatibility/2006">
-    <mc:Choice xmlns:p14="http://schemas.microsoft.com/office/powerpoint/2010/main" Requires="p14">
+  <mc:AlternateContent xmlns:mc="http://schemas.openxmlformats.org/markup-compatibility/2006" xmlns:p14="http://schemas.microsoft.com/office/powerpoint/2010/main">
+    <mc:Choice Requires="p14">
       <p:transition p14:dur="10"/>
     </mc:Choice>
-    <mc:Fallback>
+    <mc:Fallback xmlns="">
       <p:transition/>
     </mc:Fallback>
   </mc:AlternateContent>

</xml_diff>